<commit_message>
Parallel programs readings, lecture notes, and exercises
</commit_message>
<xml_diff>
--- a/lectures/04-parallel-architecture.pptx
+++ b/lectures/04-parallel-architecture.pptx
@@ -209,7 +209,7 @@
           <a:p>
             <a:fld id="{A944E646-4712-4FB9-B0CE-0A4DF6C920AD}" type="datetimeFigureOut">
               <a:rPr lang="en-US"/>
-              <a:t>9/8/2016</a:t>
+              <a:t>9/9/2016</a:t>
             </a:fld>
             <a:endParaRPr lang="en-US"/>
           </a:p>
@@ -1254,7 +1254,7 @@
             <a:fld id="{8DF9E8F3-4849-FA48-B4C8-2D894E979956}" type="datetimeFigureOut">
               <a:rPr lang="nn-NO" smtClean="0"/>
               <a:pPr/>
-              <a:t>08.09.2016</a:t>
+              <a:t>09.09.2016</a:t>
             </a:fld>
             <a:endParaRPr lang="nn-NO"/>
           </a:p>
@@ -1539,7 +1539,7 @@
             <a:fld id="{8DF9E8F3-4849-FA48-B4C8-2D894E979956}" type="datetimeFigureOut">
               <a:rPr lang="nn-NO" smtClean="0"/>
               <a:pPr/>
-              <a:t>08.09.2016</a:t>
+              <a:t>09.09.2016</a:t>
             </a:fld>
             <a:endParaRPr lang="nn-NO"/>
           </a:p>
@@ -1654,7 +1654,7 @@
             <a:fld id="{8DF9E8F3-4849-FA48-B4C8-2D894E979956}" type="datetimeFigureOut">
               <a:rPr lang="nn-NO" smtClean="0"/>
               <a:pPr/>
-              <a:t>08.09.2016</a:t>
+              <a:t>09.09.2016</a:t>
             </a:fld>
             <a:endParaRPr lang="nn-NO"/>
           </a:p>
@@ -1804,7 +1804,7 @@
             <a:fld id="{8DF9E8F3-4849-FA48-B4C8-2D894E979956}" type="datetimeFigureOut">
               <a:rPr lang="nn-NO" smtClean="0"/>
               <a:pPr/>
-              <a:t>08.09.2016</a:t>
+              <a:t>09.09.2016</a:t>
             </a:fld>
             <a:endParaRPr lang="nn-NO"/>
           </a:p>
@@ -1896,7 +1896,7 @@
             <a:fld id="{8DF9E8F3-4849-FA48-B4C8-2D894E979956}" type="datetimeFigureOut">
               <a:rPr lang="nn-NO" smtClean="0"/>
               <a:pPr/>
-              <a:t>08.09.2016</a:t>
+              <a:t>09.09.2016</a:t>
             </a:fld>
             <a:endParaRPr lang="nn-NO" dirty="0"/>
           </a:p>
@@ -2723,7 +2723,7 @@
             <a:fld id="{8DF9E8F3-4849-FA48-B4C8-2D894E979956}" type="datetimeFigureOut">
               <a:rPr lang="nn-NO" smtClean="0"/>
               <a:pPr/>
-              <a:t>08.09.2016</a:t>
+              <a:t>09.09.2016</a:t>
             </a:fld>
             <a:endParaRPr lang="nn-NO" dirty="0"/>
           </a:p>
@@ -3300,9 +3300,14 @@
           </a:p>
           <a:p>
             <a:r>
-              <a:rPr lang="en-US" sz="2000" dirty="0"/>
-              <a:t>Fall 2015</a:t>
+              <a:rPr lang="en-US" sz="2000"/>
+              <a:t>Fall </a:t>
             </a:r>
+            <a:r>
+              <a:rPr lang="en-US" sz="2000" smtClean="0"/>
+              <a:t>2016</a:t>
+            </a:r>
+            <a:endParaRPr lang="en-US" sz="2000" dirty="0"/>
           </a:p>
           <a:p>
             <a:r>
@@ -3363,19 +3368,7 @@
               <a:rPr lang="en-US" dirty="0" smtClean="0">
                 <a:hlinkClick r:id="rId3" action="ppaction://hlinkpres?slideindex=1&amp;slidetitle="/>
               </a:rPr>
-              <a:t>Chapter </a:t>
-            </a:r>
-            <a:r>
-              <a:rPr lang="en-US" dirty="0" smtClean="0">
-                <a:hlinkClick r:id="rId3" action="ppaction://hlinkpres?slideindex=1&amp;slidetitle="/>
-              </a:rPr>
-              <a:t>6 </a:t>
-            </a:r>
-            <a:r>
-              <a:rPr lang="en-US" dirty="0" smtClean="0">
-                <a:hlinkClick r:id="rId3" action="ppaction://hlinkpres?slideindex=1&amp;slidetitle="/>
-              </a:rPr>
-              <a:t>from Computer Organization and Design</a:t>
+              <a:t>Chapter 6 from Computer Organization and Design</a:t>
             </a:r>
             <a:endParaRPr lang="en-US" dirty="0" smtClean="0"/>
           </a:p>
@@ -3981,12 +3974,9 @@
 </file>
 
 <file path=customXml/item1.xml><?xml version="1.0" encoding="utf-8"?>
-<?mso-contentType ?>
-<FormTemplates xmlns="http://schemas.microsoft.com/sharepoint/v3/contenttype/forms">
-  <Display>DocumentLibraryForm</Display>
-  <Edit>DocumentLibraryForm</Edit>
-  <New>DocumentLibraryForm</New>
-</FormTemplates>
+<p:properties xmlns:p="http://schemas.microsoft.com/office/2006/metadata/properties" xmlns:xsi="http://www.w3.org/2001/XMLSchema-instance" xmlns:pc="http://schemas.microsoft.com/office/infopath/2007/PartnerControls">
+  <documentManagement/>
+</p:properties>
 </file>
 
 <file path=customXml/item2.xml><?xml version="1.0" encoding="utf-8"?>
@@ -4104,15 +4094,25 @@
 </file>
 
 <file path=customXml/item3.xml><?xml version="1.0" encoding="utf-8"?>
-<p:properties xmlns:p="http://schemas.microsoft.com/office/2006/metadata/properties" xmlns:xsi="http://www.w3.org/2001/XMLSchema-instance" xmlns:pc="http://schemas.microsoft.com/office/infopath/2007/PartnerControls">
-  <documentManagement/>
-</p:properties>
+<?mso-contentType ?>
+<FormTemplates xmlns="http://schemas.microsoft.com/sharepoint/v3/contenttype/forms">
+  <Display>DocumentLibraryForm</Display>
+  <Edit>DocumentLibraryForm</Edit>
+  <New>DocumentLibraryForm</New>
+</FormTemplates>
 </file>
 
 <file path=customXml/itemProps1.xml><?xml version="1.0" encoding="utf-8"?>
-<ds:datastoreItem xmlns:ds="http://schemas.openxmlformats.org/officeDocument/2006/customXml" ds:itemID="{206E4F73-1A5E-4CA1-A5AF-5BB45BEB58CB}">
+<ds:datastoreItem xmlns:ds="http://schemas.openxmlformats.org/officeDocument/2006/customXml" ds:itemID="{9CD500F3-417C-4C20-9C27-B3AE9BE9E38B}">
   <ds:schemaRefs>
-    <ds:schemaRef ds:uri="http://schemas.microsoft.com/sharepoint/v3/contenttype/forms"/>
+    <ds:schemaRef ds:uri="http://schemas.microsoft.com/office/2006/documentManagement/types"/>
+    <ds:schemaRef ds:uri="http://www.w3.org/XML/1998/namespace"/>
+    <ds:schemaRef ds:uri="http://schemas.microsoft.com/office/2006/metadata/properties"/>
+    <ds:schemaRef ds:uri="http://schemas.microsoft.com/office/infopath/2007/PartnerControls"/>
+    <ds:schemaRef ds:uri="http://purl.org/dc/elements/1.1/"/>
+    <ds:schemaRef ds:uri="http://purl.org/dc/dcmitype/"/>
+    <ds:schemaRef ds:uri="http://schemas.openxmlformats.org/package/2006/metadata/core-properties"/>
+    <ds:schemaRef ds:uri="http://purl.org/dc/terms/"/>
   </ds:schemaRefs>
 </ds:datastoreItem>
 </file>
@@ -4134,16 +4134,9 @@
 </file>
 
 <file path=customXml/itemProps3.xml><?xml version="1.0" encoding="utf-8"?>
-<ds:datastoreItem xmlns:ds="http://schemas.openxmlformats.org/officeDocument/2006/customXml" ds:itemID="{9CD500F3-417C-4C20-9C27-B3AE9BE9E38B}">
+<ds:datastoreItem xmlns:ds="http://schemas.openxmlformats.org/officeDocument/2006/customXml" ds:itemID="{206E4F73-1A5E-4CA1-A5AF-5BB45BEB58CB}">
   <ds:schemaRefs>
-    <ds:schemaRef ds:uri="http://schemas.microsoft.com/office/2006/documentManagement/types"/>
-    <ds:schemaRef ds:uri="http://www.w3.org/XML/1998/namespace"/>
-    <ds:schemaRef ds:uri="http://schemas.microsoft.com/office/2006/metadata/properties"/>
-    <ds:schemaRef ds:uri="http://schemas.microsoft.com/office/infopath/2007/PartnerControls"/>
-    <ds:schemaRef ds:uri="http://purl.org/dc/elements/1.1/"/>
-    <ds:schemaRef ds:uri="http://purl.org/dc/dcmitype/"/>
-    <ds:schemaRef ds:uri="http://schemas.openxmlformats.org/package/2006/metadata/core-properties"/>
-    <ds:schemaRef ds:uri="http://purl.org/dc/terms/"/>
+    <ds:schemaRef ds:uri="http://schemas.microsoft.com/sharepoint/v3/contenttype/forms"/>
   </ds:schemaRefs>
 </ds:datastoreItem>
 </file>
</xml_diff>